<commit_message>
added .pdf for circuit bootstrapping
</commit_message>
<xml_diff>
--- a/rust/fhe-vm/Circuit Bootstrapping.pptx
+++ b/rust/fhe-vm/Circuit Bootstrapping.pptx
@@ -243,7 +243,7 @@
           <a:p>
             <a:fld id="{ACDE5943-2F48-4A72-B52D-C3C680555ED3}" type="datetimeFigureOut">
               <a:rPr lang="en-US" smtClean="0"/>
-              <a:t>1/20/2025</a:t>
+              <a:t>1/21/2025</a:t>
             </a:fld>
             <a:endParaRPr lang="en-US"/>
           </a:p>
@@ -413,7 +413,7 @@
           <a:p>
             <a:fld id="{ACDE5943-2F48-4A72-B52D-C3C680555ED3}" type="datetimeFigureOut">
               <a:rPr lang="en-US" smtClean="0"/>
-              <a:t>1/20/2025</a:t>
+              <a:t>1/21/2025</a:t>
             </a:fld>
             <a:endParaRPr lang="en-US"/>
           </a:p>
@@ -593,7 +593,7 @@
           <a:p>
             <a:fld id="{ACDE5943-2F48-4A72-B52D-C3C680555ED3}" type="datetimeFigureOut">
               <a:rPr lang="en-US" smtClean="0"/>
-              <a:t>1/20/2025</a:t>
+              <a:t>1/21/2025</a:t>
             </a:fld>
             <a:endParaRPr lang="en-US"/>
           </a:p>
@@ -763,7 +763,7 @@
           <a:p>
             <a:fld id="{ACDE5943-2F48-4A72-B52D-C3C680555ED3}" type="datetimeFigureOut">
               <a:rPr lang="en-US" smtClean="0"/>
-              <a:t>1/20/2025</a:t>
+              <a:t>1/21/2025</a:t>
             </a:fld>
             <a:endParaRPr lang="en-US"/>
           </a:p>
@@ -1009,7 +1009,7 @@
           <a:p>
             <a:fld id="{ACDE5943-2F48-4A72-B52D-C3C680555ED3}" type="datetimeFigureOut">
               <a:rPr lang="en-US" smtClean="0"/>
-              <a:t>1/20/2025</a:t>
+              <a:t>1/21/2025</a:t>
             </a:fld>
             <a:endParaRPr lang="en-US"/>
           </a:p>
@@ -1241,7 +1241,7 @@
           <a:p>
             <a:fld id="{ACDE5943-2F48-4A72-B52D-C3C680555ED3}" type="datetimeFigureOut">
               <a:rPr lang="en-US" smtClean="0"/>
-              <a:t>1/20/2025</a:t>
+              <a:t>1/21/2025</a:t>
             </a:fld>
             <a:endParaRPr lang="en-US"/>
           </a:p>
@@ -1608,7 +1608,7 @@
           <a:p>
             <a:fld id="{ACDE5943-2F48-4A72-B52D-C3C680555ED3}" type="datetimeFigureOut">
               <a:rPr lang="en-US" smtClean="0"/>
-              <a:t>1/20/2025</a:t>
+              <a:t>1/21/2025</a:t>
             </a:fld>
             <a:endParaRPr lang="en-US"/>
           </a:p>
@@ -1726,7 +1726,7 @@
           <a:p>
             <a:fld id="{ACDE5943-2F48-4A72-B52D-C3C680555ED3}" type="datetimeFigureOut">
               <a:rPr lang="en-US" smtClean="0"/>
-              <a:t>1/20/2025</a:t>
+              <a:t>1/21/2025</a:t>
             </a:fld>
             <a:endParaRPr lang="en-US"/>
           </a:p>
@@ -1821,7 +1821,7 @@
           <a:p>
             <a:fld id="{ACDE5943-2F48-4A72-B52D-C3C680555ED3}" type="datetimeFigureOut">
               <a:rPr lang="en-US" smtClean="0"/>
-              <a:t>1/20/2025</a:t>
+              <a:t>1/21/2025</a:t>
             </a:fld>
             <a:endParaRPr lang="en-US"/>
           </a:p>
@@ -2098,7 +2098,7 @@
           <a:p>
             <a:fld id="{ACDE5943-2F48-4A72-B52D-C3C680555ED3}" type="datetimeFigureOut">
               <a:rPr lang="en-US" smtClean="0"/>
-              <a:t>1/20/2025</a:t>
+              <a:t>1/21/2025</a:t>
             </a:fld>
             <a:endParaRPr lang="en-US"/>
           </a:p>
@@ -2355,7 +2355,7 @@
           <a:p>
             <a:fld id="{ACDE5943-2F48-4A72-B52D-C3C680555ED3}" type="datetimeFigureOut">
               <a:rPr lang="en-US" smtClean="0"/>
-              <a:t>1/20/2025</a:t>
+              <a:t>1/21/2025</a:t>
             </a:fld>
             <a:endParaRPr lang="en-US"/>
           </a:p>
@@ -2568,7 +2568,7 @@
           <a:p>
             <a:fld id="{ACDE5943-2F48-4A72-B52D-C3C680555ED3}" type="datetimeFigureOut">
               <a:rPr lang="en-US" smtClean="0"/>
-              <a:t>1/20/2025</a:t>
+              <a:t>1/21/2025</a:t>
             </a:fld>
             <a:endParaRPr lang="en-US"/>
           </a:p>
@@ -22188,6 +22188,174 @@
           </a:fontRef>
         </p:style>
       </p:cxnSp>
+      <p:sp>
+        <p:nvSpPr>
+          <p:cNvPr id="18" name="TextBox 17">
+            <a:extLst>
+              <a:ext uri="{FF2B5EF4-FFF2-40B4-BE49-F238E27FC236}">
+                <a16:creationId xmlns:a16="http://schemas.microsoft.com/office/drawing/2014/main" id="{50271F5D-23B3-1B2F-C4E8-8107A07BB811}"/>
+              </a:ext>
+            </a:extLst>
+          </p:cNvPr>
+          <p:cNvSpPr txBox="1"/>
+          <p:nvPr/>
+        </p:nvSpPr>
+        <p:spPr>
+          <a:xfrm>
+            <a:off x="13055734" y="1182520"/>
+            <a:ext cx="1270989" cy="369332"/>
+          </a:xfrm>
+          <a:prstGeom prst="rect">
+            <a:avLst/>
+          </a:prstGeom>
+          <a:noFill/>
+        </p:spPr>
+        <p:txBody>
+          <a:bodyPr wrap="none" rtlCol="0">
+            <a:spAutoFit/>
+          </a:bodyPr>
+          <a:lstStyle/>
+          <a:p>
+            <a:r>
+              <a:rPr lang="fr-CH" dirty="0"/>
+              <a:t>MAX DRIFT</a:t>
+            </a:r>
+            <a:endParaRPr lang="en-US" dirty="0"/>
+          </a:p>
+        </p:txBody>
+      </p:sp>
+      <p:sp>
+        <p:nvSpPr>
+          <p:cNvPr id="19" name="TextBox 18">
+            <a:extLst>
+              <a:ext uri="{FF2B5EF4-FFF2-40B4-BE49-F238E27FC236}">
+                <a16:creationId xmlns:a16="http://schemas.microsoft.com/office/drawing/2014/main" id="{7F82F0BD-789E-6C9B-900B-F8871EB867DF}"/>
+              </a:ext>
+            </a:extLst>
+          </p:cNvPr>
+          <p:cNvSpPr txBox="1"/>
+          <p:nvPr/>
+        </p:nvSpPr>
+        <p:spPr>
+          <a:xfrm>
+            <a:off x="18882833" y="3608356"/>
+            <a:ext cx="3593907" cy="1477328"/>
+          </a:xfrm>
+          <a:prstGeom prst="rect">
+            <a:avLst/>
+          </a:prstGeom>
+          <a:noFill/>
+        </p:spPr>
+        <p:txBody>
+          <a:bodyPr wrap="square" rtlCol="0">
+            <a:spAutoFit/>
+          </a:bodyPr>
+          <a:lstStyle/>
+          <a:p>
+            <a:r>
+              <a:rPr lang="fr-CH" dirty="0" err="1"/>
+              <a:t>Map</a:t>
+            </a:r>
+            <a:r>
+              <a:rPr lang="fr-CH" dirty="0"/>
+              <a:t> </a:t>
+            </a:r>
+            <a:r>
+              <a:rPr lang="fr-CH" dirty="0" err="1"/>
+              <a:t>from</a:t>
+            </a:r>
+            <a:r>
+              <a:rPr lang="fr-CH" dirty="0"/>
+              <a:t> </a:t>
+            </a:r>
+            <a:r>
+              <a:rPr lang="fr-CH" dirty="0" err="1"/>
+              <a:t>X^i</a:t>
+            </a:r>
+            <a:r>
+              <a:rPr lang="fr-CH" dirty="0"/>
+              <a:t> to X^{i*</a:t>
+            </a:r>
+            <a:r>
+              <a:rPr lang="fr-CH" dirty="0" err="1"/>
+              <a:t>gap_out</a:t>
+            </a:r>
+            <a:r>
+              <a:rPr lang="fr-CH" dirty="0"/>
+              <a:t>}, </a:t>
+            </a:r>
+            <a:r>
+              <a:rPr lang="fr-CH" dirty="0" err="1"/>
+              <a:t>this</a:t>
+            </a:r>
+            <a:r>
+              <a:rPr lang="fr-CH" dirty="0"/>
+              <a:t> </a:t>
+            </a:r>
+            <a:r>
+              <a:rPr lang="fr-CH" dirty="0" err="1"/>
+              <a:t>is</a:t>
+            </a:r>
+            <a:r>
+              <a:rPr lang="fr-CH" dirty="0"/>
+              <a:t> </a:t>
+            </a:r>
+            <a:r>
+              <a:rPr lang="fr-CH" dirty="0" err="1"/>
+              <a:t>needed</a:t>
+            </a:r>
+            <a:r>
+              <a:rPr lang="fr-CH" dirty="0"/>
+              <a:t> to </a:t>
+            </a:r>
+            <a:r>
+              <a:rPr lang="fr-CH" dirty="0" err="1"/>
+              <a:t>be</a:t>
+            </a:r>
+            <a:r>
+              <a:rPr lang="fr-CH" dirty="0"/>
+              <a:t> able to support </a:t>
+            </a:r>
+            <a:r>
+              <a:rPr lang="fr-CH" dirty="0" err="1"/>
+              <a:t>different</a:t>
+            </a:r>
+            <a:r>
+              <a:rPr lang="fr-CH" dirty="0"/>
+              <a:t> base 2 </a:t>
+            </a:r>
+            <a:r>
+              <a:rPr lang="fr-CH" dirty="0" err="1"/>
+              <a:t>than</a:t>
+            </a:r>
+            <a:r>
+              <a:rPr lang="fr-CH" dirty="0"/>
+              <a:t> the one in the circuit </a:t>
+            </a:r>
+            <a:r>
+              <a:rPr lang="fr-CH" dirty="0" err="1"/>
+              <a:t>bootstrapping</a:t>
+            </a:r>
+            <a:r>
+              <a:rPr lang="fr-CH" dirty="0"/>
+              <a:t> if n-</a:t>
+            </a:r>
+            <a:r>
+              <a:rPr lang="fr-CH" dirty="0" err="1"/>
+              <a:t>bootstrapping</a:t>
+            </a:r>
+            <a:r>
+              <a:rPr lang="fr-CH" dirty="0"/>
+              <a:t>/drift &lt; index </a:t>
+            </a:r>
+            <a:r>
+              <a:rPr lang="fr-CH" dirty="0" err="1"/>
+              <a:t>domain</a:t>
+            </a:r>
+            <a:endParaRPr lang="en-US" dirty="0"/>
+          </a:p>
+        </p:txBody>
+      </p:sp>
     </p:spTree>
     <p:extLst>
       <p:ext uri="{BB962C8B-B14F-4D97-AF65-F5344CB8AC3E}">

</xml_diff>